<commit_message>
Điều chỉnh 18b, 19
</commit_message>
<xml_diff>
--- a/Bai 18b Chia cum va ung dung trong tim kiem_phần 2.pptx
+++ b/Bai 18b Chia cum va ung dung trong tim kiem_phần 2.pptx
@@ -157,7 +157,7 @@
   </p:defaultTextStyle>
   <p:extLst>
     <p:ext uri="{EFAFB233-063F-42B5-8137-9DF3F51BA10A}">
-      <p15:sldGuideLst xmlns="" xmlns:p15="http://schemas.microsoft.com/office/powerpoint/2012/main">
+      <p15:sldGuideLst xmlns:p15="http://schemas.microsoft.com/office/powerpoint/2012/main">
         <p15:guide id="1" orient="horz" pos="2160">
           <p15:clr>
             <a:srgbClr val="A4A3A4"/>
@@ -6771,11 +6771,7 @@
             </a:r>
             <a:r>
               <a:rPr lang="vi-VN" sz="2800" smtClean="0"/>
-              <a:t>tìm </a:t>
-            </a:r>
-            <a:r>
-              <a:rPr lang="vi-VN" sz="2800" smtClean="0"/>
-              <a:t>kiếm (2)</a:t>
+              <a:t>tìm kiếm (2)</a:t>
             </a:r>
             <a:endParaRPr lang="vi-VN" sz="2000" dirty="0" smtClean="0"/>
           </a:p>
@@ -7280,11 +7276,7 @@
             </a:pPr>
             <a:r>
               <a:rPr lang="vi-VN" sz="2800" smtClean="0"/>
-              <a:t>Ý tưởng</a:t>
-            </a:r>
-            <a:r>
-              <a:rPr lang="vi-VN" sz="2800" smtClean="0"/>
-              <a:t>: Coi kết quả phân lớp là phương án chia cụm tối ưu, đáp ứng tốt nhất các tiêu chí chia cụm.</a:t>
+              <a:t>Ý tưởng: Coi kết quả phân lớp là phương án chia cụm tối ưu, đáp ứng tốt nhất các tiêu chí chia cụm.</a:t>
             </a:r>
           </a:p>
           <a:p>
@@ -7410,11 +7402,7 @@
             <a:pPr eaLnBrk="1" hangingPunct="1"/>
             <a:r>
               <a:rPr lang="vi-VN" sz="3600" smtClean="0"/>
-              <a:t>Độ đo </a:t>
-            </a:r>
-            <a:r>
-              <a:rPr lang="vi-VN" sz="3600" smtClean="0"/>
-              <a:t>Purity</a:t>
+              <a:t>Độ đo Purity</a:t>
             </a:r>
             <a:endParaRPr lang="vi-VN" sz="3600" dirty="0" smtClean="0"/>
           </a:p>
@@ -7491,11 +7479,7 @@
             </a:r>
             <a:r>
               <a:rPr lang="vi-VN" sz="2800" smtClean="0"/>
-              <a:t>là </a:t>
-            </a:r>
-            <a:r>
-              <a:rPr lang="vi-VN" sz="2800" smtClean="0"/>
-              <a:t>tập cụm</a:t>
+              <a:t>là tập cụm</a:t>
             </a:r>
             <a:r>
               <a:rPr lang="vi-VN" sz="2800" dirty="0" smtClean="0"/>
@@ -7548,19 +7532,7 @@
             </a:r>
             <a:r>
               <a:rPr lang="vi-VN" sz="2800" smtClean="0"/>
-              <a:t>là </a:t>
-            </a:r>
-            <a:r>
-              <a:rPr lang="vi-VN" sz="2800" smtClean="0"/>
-              <a:t>tập </a:t>
-            </a:r>
-            <a:r>
-              <a:rPr lang="vi-VN" sz="2800" smtClean="0"/>
-              <a:t>lớp</a:t>
-            </a:r>
-            <a:r>
-              <a:rPr lang="vi-VN" sz="2800" smtClean="0"/>
-              <a:t>.</a:t>
+              <a:t>là tập lớp.</a:t>
             </a:r>
           </a:p>
         </p:txBody>
@@ -7673,11 +7645,7 @@
             <a:pPr eaLnBrk="1" hangingPunct="1"/>
             <a:r>
               <a:rPr lang="vi-VN" sz="3600" smtClean="0"/>
-              <a:t>Ví </a:t>
-            </a:r>
-            <a:r>
-              <a:rPr lang="vi-VN" sz="3600" smtClean="0"/>
-              <a:t>dụ Purity</a:t>
+              <a:t>Ví dụ Purity</a:t>
             </a:r>
             <a:endParaRPr lang="vi-VN" sz="3600" dirty="0" smtClean="0"/>
           </a:p>
@@ -8121,7 +8089,7 @@
           <p:nvPr>
             <p:extLst>
               <p:ext uri="{D42A27DB-BD31-4B8C-83A1-F6EECF244321}">
-                <p14:modId xmlns:p14="http://schemas.microsoft.com/office/powerpoint/2010/main" val="948502622"/>
+                <p14:modId xmlns:p14="http://schemas.microsoft.com/office/powerpoint/2010/main" val="2892081465"/>
               </p:ext>
             </p:extLst>
           </p:nvPr>
@@ -8589,8 +8557,33 @@
                           <a:latin typeface="Tahoma" panose="020B0604030504040204" pitchFamily="34" charset="0"/>
                           <a:cs typeface="Tahoma" panose="020B0604030504040204" pitchFamily="34" charset="0"/>
                         </a:rPr>
-                        <a:t>Cùng cụm</a:t>
+                        <a:t>Cùng </a:t>
                       </a:r>
+                      <a:r>
+                        <a:rPr kumimoji="0" lang="en-US" sz="1800" b="0" i="0" u="none" strike="noStrike" cap="none" normalizeH="0" baseline="0" noProof="0" dirty="0" err="1" smtClean="0">
+                          <a:ln>
+                            <a:noFill/>
+                          </a:ln>
+                          <a:solidFill>
+                            <a:schemeClr val="tx1"/>
+                          </a:solidFill>
+                          <a:effectLst/>
+                          <a:latin typeface="Tahoma" panose="020B0604030504040204" pitchFamily="34" charset="0"/>
+                          <a:cs typeface="Tahoma" panose="020B0604030504040204" pitchFamily="34" charset="0"/>
+                        </a:rPr>
+                        <a:t>lớp</a:t>
+                      </a:r>
+                      <a:endParaRPr kumimoji="0" lang="vi-VN" sz="1800" b="0" i="0" u="none" strike="noStrike" cap="none" normalizeH="0" baseline="0" noProof="0" dirty="0" smtClean="0">
+                        <a:ln>
+                          <a:noFill/>
+                        </a:ln>
+                        <a:solidFill>
+                          <a:schemeClr val="tx1"/>
+                        </a:solidFill>
+                        <a:effectLst/>
+                        <a:latin typeface="Tahoma" panose="020B0604030504040204" pitchFamily="34" charset="0"/>
+                        <a:cs typeface="Tahoma" panose="020B0604030504040204" pitchFamily="34" charset="0"/>
+                      </a:endParaRPr>
                     </a:p>
                   </a:txBody>
                   <a:tcPr horzOverflow="overflow">
@@ -8840,8 +8833,33 @@
                           <a:latin typeface="Tahoma" panose="020B0604030504040204" pitchFamily="34" charset="0"/>
                           <a:cs typeface="Tahoma" panose="020B0604030504040204" pitchFamily="34" charset="0"/>
                         </a:rPr>
-                        <a:t>Khác cụm</a:t>
+                        <a:t>Khác </a:t>
                       </a:r>
+                      <a:r>
+                        <a:rPr kumimoji="0" lang="en-US" sz="1800" b="0" i="0" u="none" strike="noStrike" cap="none" normalizeH="0" baseline="0" noProof="0" dirty="0" err="1" smtClean="0">
+                          <a:ln>
+                            <a:noFill/>
+                          </a:ln>
+                          <a:solidFill>
+                            <a:schemeClr val="tx1"/>
+                          </a:solidFill>
+                          <a:effectLst/>
+                          <a:latin typeface="Tahoma" panose="020B0604030504040204" pitchFamily="34" charset="0"/>
+                          <a:cs typeface="Tahoma" panose="020B0604030504040204" pitchFamily="34" charset="0"/>
+                        </a:rPr>
+                        <a:t>lớp</a:t>
+                      </a:r>
+                      <a:endParaRPr kumimoji="0" lang="vi-VN" sz="1800" b="0" i="0" u="none" strike="noStrike" cap="none" normalizeH="0" baseline="0" noProof="0" dirty="0" smtClean="0">
+                        <a:ln>
+                          <a:noFill/>
+                        </a:ln>
+                        <a:solidFill>
+                          <a:schemeClr val="tx1"/>
+                        </a:solidFill>
+                        <a:effectLst/>
+                        <a:latin typeface="Tahoma" panose="020B0604030504040204" pitchFamily="34" charset="0"/>
+                        <a:cs typeface="Tahoma" panose="020B0604030504040204" pitchFamily="34" charset="0"/>
+                      </a:endParaRPr>
                     </a:p>
                   </a:txBody>
                   <a:tcPr horzOverflow="overflow">
@@ -9093,8 +9111,33 @@
                           <a:latin typeface="Tahoma" panose="020B0604030504040204" pitchFamily="34" charset="0"/>
                           <a:cs typeface="Tahoma" panose="020B0604030504040204" pitchFamily="34" charset="0"/>
                         </a:rPr>
-                        <a:t>Cùng lớp</a:t>
+                        <a:t>Cùng </a:t>
                       </a:r>
+                      <a:r>
+                        <a:rPr kumimoji="0" lang="en-US" sz="1800" b="0" i="0" u="none" strike="noStrike" cap="none" normalizeH="0" baseline="0" noProof="0" dirty="0" err="1" smtClean="0">
+                          <a:ln>
+                            <a:noFill/>
+                          </a:ln>
+                          <a:solidFill>
+                            <a:schemeClr val="tx1"/>
+                          </a:solidFill>
+                          <a:effectLst/>
+                          <a:latin typeface="Tahoma" panose="020B0604030504040204" pitchFamily="34" charset="0"/>
+                          <a:cs typeface="Tahoma" panose="020B0604030504040204" pitchFamily="34" charset="0"/>
+                        </a:rPr>
+                        <a:t>cụm</a:t>
+                      </a:r>
+                      <a:endParaRPr kumimoji="0" lang="vi-VN" sz="1800" b="0" i="0" u="none" strike="noStrike" cap="none" normalizeH="0" baseline="0" noProof="0" dirty="0" smtClean="0">
+                        <a:ln>
+                          <a:noFill/>
+                        </a:ln>
+                        <a:solidFill>
+                          <a:schemeClr val="tx1"/>
+                        </a:solidFill>
+                        <a:effectLst/>
+                        <a:latin typeface="Tahoma" panose="020B0604030504040204" pitchFamily="34" charset="0"/>
+                        <a:cs typeface="Tahoma" panose="020B0604030504040204" pitchFamily="34" charset="0"/>
+                      </a:endParaRPr>
                     </a:p>
                   </a:txBody>
                   <a:tcPr horzOverflow="overflow">
@@ -9870,8 +9913,33 @@
                           <a:latin typeface="Tahoma" panose="020B0604030504040204" pitchFamily="34" charset="0"/>
                           <a:cs typeface="Tahoma" panose="020B0604030504040204" pitchFamily="34" charset="0"/>
                         </a:rPr>
-                        <a:t>Khác lớp</a:t>
+                        <a:t>Khác </a:t>
                       </a:r>
+                      <a:r>
+                        <a:rPr kumimoji="0" lang="en-US" sz="1800" b="0" i="0" u="none" strike="noStrike" cap="none" normalizeH="0" baseline="0" noProof="0" dirty="0" err="1" smtClean="0">
+                          <a:ln>
+                            <a:noFill/>
+                          </a:ln>
+                          <a:solidFill>
+                            <a:schemeClr val="tx1"/>
+                          </a:solidFill>
+                          <a:effectLst/>
+                          <a:latin typeface="Tahoma" panose="020B0604030504040204" pitchFamily="34" charset="0"/>
+                          <a:cs typeface="Tahoma" panose="020B0604030504040204" pitchFamily="34" charset="0"/>
+                        </a:rPr>
+                        <a:t>cụm</a:t>
+                      </a:r>
+                      <a:endParaRPr kumimoji="0" lang="vi-VN" sz="1800" b="0" i="0" u="none" strike="noStrike" cap="none" normalizeH="0" baseline="0" noProof="0" dirty="0" smtClean="0">
+                        <a:ln>
+                          <a:noFill/>
+                        </a:ln>
+                        <a:solidFill>
+                          <a:schemeClr val="tx1"/>
+                        </a:solidFill>
+                        <a:effectLst/>
+                        <a:latin typeface="Tahoma" panose="020B0604030504040204" pitchFamily="34" charset="0"/>
+                        <a:cs typeface="Tahoma" panose="020B0604030504040204" pitchFamily="34" charset="0"/>
+                      </a:endParaRPr>
                     </a:p>
                   </a:txBody>
                   <a:tcPr horzOverflow="overflow">
@@ -10504,11 +10572,7 @@
             <a:pPr eaLnBrk="1" hangingPunct="1"/>
             <a:r>
               <a:rPr lang="vi-VN" sz="3600" smtClean="0"/>
-              <a:t>Ví </a:t>
-            </a:r>
-            <a:r>
-              <a:rPr lang="vi-VN" sz="3600" smtClean="0"/>
-              <a:t>dụ </a:t>
+              <a:t>Ví dụ </a:t>
             </a:r>
             <a:r>
               <a:rPr lang="en-US" sz="3600" smtClean="0"/>
@@ -10591,7 +10655,7 @@
         </p:blipFill>
         <p:spPr>
           <a:xfrm>
-            <a:off x="899592" y="4221088"/>
+            <a:off x="899592" y="5220240"/>
             <a:ext cx="5275739" cy="792000"/>
           </a:xfrm>
           <a:prstGeom prst="rect">
@@ -10615,7 +10679,7 @@
         </p:blipFill>
         <p:spPr>
           <a:xfrm>
-            <a:off x="923147" y="5086838"/>
+            <a:off x="870039" y="4353060"/>
             <a:ext cx="5735610" cy="792000"/>
           </a:xfrm>
           <a:prstGeom prst="rect">
@@ -10716,11 +10780,7 @@
             <a:pPr eaLnBrk="1" hangingPunct="1"/>
             <a:r>
               <a:rPr lang="vi-VN" sz="3600" smtClean="0"/>
-              <a:t>Ví </a:t>
-            </a:r>
-            <a:r>
-              <a:rPr lang="vi-VN" sz="3600" smtClean="0"/>
-              <a:t>dụ Rand </a:t>
+              <a:t>Ví dụ Rand </a:t>
             </a:r>
             <a:r>
               <a:rPr lang="vi-VN" sz="3600" dirty="0" smtClean="0"/>
@@ -10767,7 +10827,7 @@
           <p:nvPr>
             <p:extLst>
               <p:ext uri="{D42A27DB-BD31-4B8C-83A1-F6EECF244321}">
-                <p14:modId xmlns:p14="http://schemas.microsoft.com/office/powerpoint/2010/main" val="2046706912"/>
+                <p14:modId xmlns:p14="http://schemas.microsoft.com/office/powerpoint/2010/main" val="747210669"/>
               </p:ext>
             </p:extLst>
           </p:nvPr>
@@ -11235,8 +11295,33 @@
                           <a:latin typeface="Tahoma" panose="020B0604030504040204" pitchFamily="34" charset="0"/>
                           <a:cs typeface="Tahoma" panose="020B0604030504040204" pitchFamily="34" charset="0"/>
                         </a:rPr>
-                        <a:t>Cùng cụm</a:t>
+                        <a:t>Cùng </a:t>
                       </a:r>
+                      <a:r>
+                        <a:rPr kumimoji="0" lang="en-US" sz="1800" b="0" i="0" u="none" strike="noStrike" cap="none" normalizeH="0" baseline="0" noProof="0" dirty="0" err="1" smtClean="0">
+                          <a:ln>
+                            <a:noFill/>
+                          </a:ln>
+                          <a:solidFill>
+                            <a:schemeClr val="tx1"/>
+                          </a:solidFill>
+                          <a:effectLst/>
+                          <a:latin typeface="Tahoma" panose="020B0604030504040204" pitchFamily="34" charset="0"/>
+                          <a:cs typeface="Tahoma" panose="020B0604030504040204" pitchFamily="34" charset="0"/>
+                        </a:rPr>
+                        <a:t>lớp</a:t>
+                      </a:r>
+                      <a:endParaRPr kumimoji="0" lang="vi-VN" sz="1800" b="0" i="0" u="none" strike="noStrike" cap="none" normalizeH="0" baseline="0" noProof="0" dirty="0" smtClean="0">
+                        <a:ln>
+                          <a:noFill/>
+                        </a:ln>
+                        <a:solidFill>
+                          <a:schemeClr val="tx1"/>
+                        </a:solidFill>
+                        <a:effectLst/>
+                        <a:latin typeface="Tahoma" panose="020B0604030504040204" pitchFamily="34" charset="0"/>
+                        <a:cs typeface="Tahoma" panose="020B0604030504040204" pitchFamily="34" charset="0"/>
+                      </a:endParaRPr>
                     </a:p>
                   </a:txBody>
                   <a:tcPr horzOverflow="overflow">
@@ -11486,8 +11571,33 @@
                           <a:latin typeface="Tahoma" panose="020B0604030504040204" pitchFamily="34" charset="0"/>
                           <a:cs typeface="Tahoma" panose="020B0604030504040204" pitchFamily="34" charset="0"/>
                         </a:rPr>
-                        <a:t>Khác cụm</a:t>
+                        <a:t>Khác </a:t>
                       </a:r>
+                      <a:r>
+                        <a:rPr kumimoji="0" lang="en-US" sz="1800" b="0" i="0" u="none" strike="noStrike" cap="none" normalizeH="0" baseline="0" noProof="0" dirty="0" err="1" smtClean="0">
+                          <a:ln>
+                            <a:noFill/>
+                          </a:ln>
+                          <a:solidFill>
+                            <a:schemeClr val="tx1"/>
+                          </a:solidFill>
+                          <a:effectLst/>
+                          <a:latin typeface="Tahoma" panose="020B0604030504040204" pitchFamily="34" charset="0"/>
+                          <a:cs typeface="Tahoma" panose="020B0604030504040204" pitchFamily="34" charset="0"/>
+                        </a:rPr>
+                        <a:t>lớp</a:t>
+                      </a:r>
+                      <a:endParaRPr kumimoji="0" lang="vi-VN" sz="1800" b="0" i="0" u="none" strike="noStrike" cap="none" normalizeH="0" baseline="0" noProof="0" dirty="0" smtClean="0">
+                        <a:ln>
+                          <a:noFill/>
+                        </a:ln>
+                        <a:solidFill>
+                          <a:schemeClr val="tx1"/>
+                        </a:solidFill>
+                        <a:effectLst/>
+                        <a:latin typeface="Tahoma" panose="020B0604030504040204" pitchFamily="34" charset="0"/>
+                        <a:cs typeface="Tahoma" panose="020B0604030504040204" pitchFamily="34" charset="0"/>
+                      </a:endParaRPr>
                     </a:p>
                   </a:txBody>
                   <a:tcPr horzOverflow="overflow">
@@ -11739,8 +11849,33 @@
                           <a:latin typeface="Tahoma" panose="020B0604030504040204" pitchFamily="34" charset="0"/>
                           <a:cs typeface="Tahoma" panose="020B0604030504040204" pitchFamily="34" charset="0"/>
                         </a:rPr>
-                        <a:t>Cùng lớp</a:t>
+                        <a:t>Cùng </a:t>
                       </a:r>
+                      <a:r>
+                        <a:rPr kumimoji="0" lang="en-US" sz="1800" b="0" i="0" u="none" strike="noStrike" cap="none" normalizeH="0" baseline="0" noProof="0" dirty="0" err="1" smtClean="0">
+                          <a:ln>
+                            <a:noFill/>
+                          </a:ln>
+                          <a:solidFill>
+                            <a:schemeClr val="tx1"/>
+                          </a:solidFill>
+                          <a:effectLst/>
+                          <a:latin typeface="Tahoma" panose="020B0604030504040204" pitchFamily="34" charset="0"/>
+                          <a:cs typeface="Tahoma" panose="020B0604030504040204" pitchFamily="34" charset="0"/>
+                        </a:rPr>
+                        <a:t>cụm</a:t>
+                      </a:r>
+                      <a:endParaRPr kumimoji="0" lang="vi-VN" sz="1800" b="0" i="0" u="none" strike="noStrike" cap="none" normalizeH="0" baseline="0" noProof="0" dirty="0" smtClean="0">
+                        <a:ln>
+                          <a:noFill/>
+                        </a:ln>
+                        <a:solidFill>
+                          <a:schemeClr val="tx1"/>
+                        </a:solidFill>
+                        <a:effectLst/>
+                        <a:latin typeface="Tahoma" panose="020B0604030504040204" pitchFamily="34" charset="0"/>
+                        <a:cs typeface="Tahoma" panose="020B0604030504040204" pitchFamily="34" charset="0"/>
+                      </a:endParaRPr>
                     </a:p>
                   </a:txBody>
                   <a:tcPr horzOverflow="overflow">
@@ -12252,7 +12387,21 @@
                           <a:latin typeface="Tahoma" panose="020B0604030504040204" pitchFamily="34" charset="0"/>
                           <a:cs typeface="Tahoma" panose="020B0604030504040204" pitchFamily="34" charset="0"/>
                         </a:rPr>
-                        <a:t>FP = 24</a:t>
+                        <a:t>FP = </a:t>
+                      </a:r>
+                      <a:r>
+                        <a:rPr kumimoji="0" lang="en-US" sz="1800" b="0" i="0" u="none" strike="noStrike" cap="none" normalizeH="0" baseline="0" dirty="0" smtClean="0">
+                          <a:ln>
+                            <a:noFill/>
+                          </a:ln>
+                          <a:solidFill>
+                            <a:schemeClr val="tx1"/>
+                          </a:solidFill>
+                          <a:effectLst/>
+                          <a:latin typeface="Tahoma" panose="020B0604030504040204" pitchFamily="34" charset="0"/>
+                          <a:cs typeface="Tahoma" panose="020B0604030504040204" pitchFamily="34" charset="0"/>
+                        </a:rPr>
+                        <a:t>20</a:t>
                       </a:r>
                       <a:endParaRPr kumimoji="0" lang="vi-VN" sz="1800" b="0" i="0" u="none" strike="noStrike" cap="none" normalizeH="0" baseline="0" dirty="0" smtClean="0">
                         <a:ln>
@@ -12516,8 +12665,33 @@
                           <a:latin typeface="Tahoma" panose="020B0604030504040204" pitchFamily="34" charset="0"/>
                           <a:cs typeface="Tahoma" panose="020B0604030504040204" pitchFamily="34" charset="0"/>
                         </a:rPr>
-                        <a:t>Khác lớp</a:t>
+                        <a:t>Khác </a:t>
                       </a:r>
+                      <a:r>
+                        <a:rPr kumimoji="0" lang="en-US" sz="1800" b="0" i="0" u="none" strike="noStrike" cap="none" normalizeH="0" baseline="0" noProof="0" dirty="0" err="1" smtClean="0">
+                          <a:ln>
+                            <a:noFill/>
+                          </a:ln>
+                          <a:solidFill>
+                            <a:schemeClr val="tx1"/>
+                          </a:solidFill>
+                          <a:effectLst/>
+                          <a:latin typeface="Tahoma" panose="020B0604030504040204" pitchFamily="34" charset="0"/>
+                          <a:cs typeface="Tahoma" panose="020B0604030504040204" pitchFamily="34" charset="0"/>
+                        </a:rPr>
+                        <a:t>cụm</a:t>
+                      </a:r>
+                      <a:endParaRPr kumimoji="0" lang="vi-VN" sz="1800" b="0" i="0" u="none" strike="noStrike" cap="none" normalizeH="0" baseline="0" noProof="0" dirty="0" smtClean="0">
+                        <a:ln>
+                          <a:noFill/>
+                        </a:ln>
+                        <a:solidFill>
+                          <a:schemeClr val="tx1"/>
+                        </a:solidFill>
+                        <a:effectLst/>
+                        <a:latin typeface="Tahoma" panose="020B0604030504040204" pitchFamily="34" charset="0"/>
+                        <a:cs typeface="Tahoma" panose="020B0604030504040204" pitchFamily="34" charset="0"/>
+                      </a:endParaRPr>
                     </a:p>
                   </a:txBody>
                   <a:tcPr horzOverflow="overflow">
@@ -12767,7 +12941,21 @@
                           <a:latin typeface="Tahoma" panose="020B0604030504040204" pitchFamily="34" charset="0"/>
                           <a:cs typeface="Tahoma" panose="020B0604030504040204" pitchFamily="34" charset="0"/>
                         </a:rPr>
-                        <a:t>FN = 20</a:t>
+                        <a:t>FN = </a:t>
+                      </a:r>
+                      <a:r>
+                        <a:rPr kumimoji="0" lang="en-US" sz="1800" b="0" i="0" u="none" strike="noStrike" cap="none" normalizeH="0" baseline="0" dirty="0" smtClean="0">
+                          <a:ln>
+                            <a:noFill/>
+                          </a:ln>
+                          <a:solidFill>
+                            <a:schemeClr val="tx1"/>
+                          </a:solidFill>
+                          <a:effectLst/>
+                          <a:latin typeface="Tahoma" panose="020B0604030504040204" pitchFamily="34" charset="0"/>
+                          <a:cs typeface="Tahoma" panose="020B0604030504040204" pitchFamily="34" charset="0"/>
+                        </a:rPr>
+                        <a:t>24</a:t>
                       </a:r>
                       <a:endParaRPr kumimoji="0" lang="vi-VN" sz="1800" b="0" i="0" u="none" strike="noStrike" cap="none" normalizeH="0" baseline="0" dirty="0" smtClean="0">
                         <a:ln>
@@ -13143,11 +13331,7 @@
           <a:p>
             <a:r>
               <a:rPr lang="en-US" sz="2400" b="0" smtClean="0"/>
-              <a:t>RI </a:t>
-            </a:r>
-            <a:r>
-              <a:rPr lang="en-US" sz="2400" b="0" smtClean="0"/>
-              <a:t>= (20 + 72)/136</a:t>
+              <a:t>RI = (20 + 72)/136</a:t>
             </a:r>
             <a:endParaRPr lang="vi-VN" sz="2400" b="0" dirty="0"/>
           </a:p>
@@ -13916,15 +14100,7 @@
             </a:pPr>
             <a:r>
               <a:rPr lang="vi-VN" sz="2800" smtClean="0"/>
-              <a:t>Tính </a:t>
-            </a:r>
-            <a:r>
-              <a:rPr lang="vi-VN" sz="2800" smtClean="0"/>
-              <a:t>hội tụ</a:t>
-            </a:r>
-            <a:r>
-              <a:rPr lang="vi-VN" sz="2800" smtClean="0"/>
-              <a:t> </a:t>
+              <a:t>Tính hội tụ </a:t>
             </a:r>
             <a:r>
               <a:rPr lang="vi-VN" sz="2800" dirty="0" smtClean="0"/>
@@ -13953,17 +14129,7 @@
                   </a:schemeClr>
                 </a:solidFill>
               </a:rPr>
-              <a:t>giá </a:t>
-            </a:r>
-            <a:r>
-              <a:rPr lang="vi-VN" sz="2800" smtClean="0">
-                <a:solidFill>
-                  <a:schemeClr val="bg1">
-                    <a:lumMod val="65000"/>
-                  </a:schemeClr>
-                </a:solidFill>
-              </a:rPr>
-              <a:t>kết quả </a:t>
+              <a:t>giá kết quả </a:t>
             </a:r>
             <a:r>
               <a:rPr lang="vi-VN" sz="2800" dirty="0" smtClean="0">
@@ -14280,8 +14446,8 @@
           </a:p>
         </p:txBody>
       </p:sp>
-      <mc:AlternateContent xmlns:mc="http://schemas.openxmlformats.org/markup-compatibility/2006">
-        <mc:Choice xmlns:a14="http://schemas.microsoft.com/office/drawing/2010/main" Requires="a14">
+      <mc:AlternateContent xmlns:mc="http://schemas.openxmlformats.org/markup-compatibility/2006" xmlns:a14="http://schemas.microsoft.com/office/drawing/2010/main">
+        <mc:Choice Requires="a14">
           <p:sp>
             <p:nvSpPr>
               <p:cNvPr id="6147" name="Rectangle 3"/>
@@ -14325,7 +14491,7 @@
                         <m:supHide m:val="on"/>
                         <m:ctrlPr>
                           <a:rPr lang="en-US" sz="2800" b="0" i="1" smtClean="0">
-                            <a:latin typeface="Cambria Math"/>
+                            <a:latin typeface="Cambria Math" panose="02040503050406030204" pitchFamily="18" charset="0"/>
                           </a:rPr>
                         </m:ctrlPr>
                       </m:naryPr>
@@ -14358,7 +14524,7 @@
                           <m:sSubPr>
                             <m:ctrlPr>
                               <a:rPr lang="en-US" sz="2800" b="0" i="1" smtClean="0">
-                                <a:latin typeface="Cambria Math"/>
+                                <a:latin typeface="Cambria Math" panose="02040503050406030204" pitchFamily="18" charset="0"/>
                               </a:rPr>
                             </m:ctrlPr>
                           </m:sSubPr>
@@ -14395,7 +14561,7 @@
                       <m:sSubPr>
                         <m:ctrlPr>
                           <a:rPr lang="en-US" sz="2800" i="1" smtClean="0">
-                            <a:latin typeface="Cambria Math"/>
+                            <a:latin typeface="Cambria Math" panose="02040503050406030204" pitchFamily="18" charset="0"/>
                           </a:rPr>
                         </m:ctrlPr>
                       </m:sSubPr>
@@ -14420,7 +14586,7 @@
                       <m:dPr>
                         <m:ctrlPr>
                           <a:rPr lang="en-US" sz="2800" b="0" i="1" smtClean="0">
-                            <a:latin typeface="Cambria Math"/>
+                            <a:latin typeface="Cambria Math" panose="02040503050406030204" pitchFamily="18" charset="0"/>
                           </a:rPr>
                         </m:ctrlPr>
                       </m:dPr>
@@ -14430,7 +14596,7 @@
                             <m:chr m:val="⃗"/>
                             <m:ctrlPr>
                               <a:rPr lang="en-US" sz="2800" b="0" i="1" smtClean="0">
-                                <a:latin typeface="Cambria Math"/>
+                                <a:latin typeface="Cambria Math" panose="02040503050406030204" pitchFamily="18" charset="0"/>
                               </a:rPr>
                             </m:ctrlPr>
                           </m:accPr>
@@ -14458,7 +14624,7 @@
                         <m:supHide m:val="on"/>
                         <m:ctrlPr>
                           <a:rPr lang="en-US" sz="2800" b="0" i="1" smtClean="0">
-                            <a:latin typeface="Cambria Math"/>
+                            <a:latin typeface="Cambria Math" panose="02040503050406030204" pitchFamily="18" charset="0"/>
                           </a:rPr>
                         </m:ctrlPr>
                       </m:naryPr>
@@ -14468,7 +14634,7 @@
                             <m:chr m:val="⃗"/>
                             <m:ctrlPr>
                               <a:rPr lang="en-US" sz="2800" b="0" i="1" smtClean="0">
-                                <a:latin typeface="Cambria Math"/>
+                                <a:latin typeface="Cambria Math" panose="02040503050406030204" pitchFamily="18" charset="0"/>
                               </a:rPr>
                             </m:ctrlPr>
                           </m:accPr>
@@ -14492,7 +14658,7 @@
                           <m:sSubPr>
                             <m:ctrlPr>
                               <a:rPr lang="en-US" sz="2800" i="1" smtClean="0">
-                                <a:latin typeface="Cambria Math"/>
+                                <a:latin typeface="Cambria Math" panose="02040503050406030204" pitchFamily="18" charset="0"/>
                                 <a:ea typeface="Cambria Math" panose="02040503050406030204" pitchFamily="18" charset="0"/>
                               </a:rPr>
                             </m:ctrlPr>
@@ -14523,7 +14689,7 @@
                           <m:sSupPr>
                             <m:ctrlPr>
                               <a:rPr lang="en-US" sz="2800" b="0" i="1" smtClean="0">
-                                <a:latin typeface="Cambria Math"/>
+                                <a:latin typeface="Cambria Math" panose="02040503050406030204" pitchFamily="18" charset="0"/>
                               </a:rPr>
                             </m:ctrlPr>
                           </m:sSupPr>
@@ -14534,7 +14700,7 @@
                                 <m:endChr m:val="‖"/>
                                 <m:ctrlPr>
                                   <a:rPr lang="en-US" sz="2800" i="1">
-                                    <a:latin typeface="Cambria Math"/>
+                                    <a:latin typeface="Cambria Math" panose="02040503050406030204" pitchFamily="18" charset="0"/>
                                   </a:rPr>
                                 </m:ctrlPr>
                               </m:dPr>
@@ -14544,7 +14710,7 @@
                                     <m:chr m:val="⃗"/>
                                     <m:ctrlPr>
                                       <a:rPr lang="en-US" sz="2800" i="1">
-                                        <a:latin typeface="Cambria Math"/>
+                                        <a:latin typeface="Cambria Math" panose="02040503050406030204" pitchFamily="18" charset="0"/>
                                       </a:rPr>
                                     </m:ctrlPr>
                                   </m:accPr>
@@ -14569,7 +14735,7 @@
                                     <m:chr m:val="⃗"/>
                                     <m:ctrlPr>
                                       <a:rPr lang="en-US" sz="2800" i="1">
-                                        <a:latin typeface="Cambria Math"/>
+                                        <a:latin typeface="Cambria Math" panose="02040503050406030204" pitchFamily="18" charset="0"/>
                                       </a:rPr>
                                     </m:ctrlPr>
                                   </m:accPr>
@@ -14610,7 +14776,7 @@
                       <m:sSubPr>
                         <m:ctrlPr>
                           <a:rPr lang="en-US" sz="2800" i="1">
-                            <a:latin typeface="Cambria Math"/>
+                            <a:latin typeface="Cambria Math" panose="02040503050406030204" pitchFamily="18" charset="0"/>
                           </a:rPr>
                         </m:ctrlPr>
                       </m:sSubPr>
@@ -14635,7 +14801,7 @@
                       <m:dPr>
                         <m:ctrlPr>
                           <a:rPr lang="en-US" sz="2800" i="1">
-                            <a:latin typeface="Cambria Math"/>
+                            <a:latin typeface="Cambria Math" panose="02040503050406030204" pitchFamily="18" charset="0"/>
                           </a:rPr>
                         </m:ctrlPr>
                       </m:dPr>
@@ -14645,7 +14811,7 @@
                             <m:chr m:val="⃗"/>
                             <m:ctrlPr>
                               <a:rPr lang="en-US" sz="2800" i="1">
-                                <a:latin typeface="Cambria Math"/>
+                                <a:latin typeface="Cambria Math" panose="02040503050406030204" pitchFamily="18" charset="0"/>
                               </a:rPr>
                             </m:ctrlPr>
                           </m:accPr>
@@ -14673,7 +14839,7 @@
                         <m:supHide m:val="on"/>
                         <m:ctrlPr>
                           <a:rPr lang="en-US" sz="2800" i="1">
-                            <a:latin typeface="Cambria Math"/>
+                            <a:latin typeface="Cambria Math" panose="02040503050406030204" pitchFamily="18" charset="0"/>
                           </a:rPr>
                         </m:ctrlPr>
                       </m:naryPr>
@@ -14683,7 +14849,7 @@
                             <m:chr m:val="⃗"/>
                             <m:ctrlPr>
                               <a:rPr lang="en-US" sz="2800" i="1">
-                                <a:latin typeface="Cambria Math"/>
+                                <a:latin typeface="Cambria Math" panose="02040503050406030204" pitchFamily="18" charset="0"/>
                               </a:rPr>
                             </m:ctrlPr>
                           </m:accPr>
@@ -14707,7 +14873,7 @@
                           <m:sSubPr>
                             <m:ctrlPr>
                               <a:rPr lang="en-US" sz="2800" i="1">
-                                <a:latin typeface="Cambria Math"/>
+                                <a:latin typeface="Cambria Math" panose="02040503050406030204" pitchFamily="18" charset="0"/>
                                 <a:ea typeface="Cambria Math" panose="02040503050406030204" pitchFamily="18" charset="0"/>
                               </a:rPr>
                             </m:ctrlPr>
@@ -14740,7 +14906,7 @@
                             <m:supHide m:val="on"/>
                             <m:ctrlPr>
                               <a:rPr lang="en-US" sz="2800" i="1" smtClean="0">
-                                <a:latin typeface="Cambria Math"/>
+                                <a:latin typeface="Cambria Math" panose="02040503050406030204" pitchFamily="18" charset="0"/>
                                 <a:ea typeface="Cambria Math" panose="02040503050406030204" pitchFamily="18" charset="0"/>
                               </a:rPr>
                             </m:ctrlPr>
@@ -14774,7 +14940,7 @@
                               <m:sSupPr>
                                 <m:ctrlPr>
                                   <a:rPr lang="en-US" sz="2800" i="1" smtClean="0">
-                                    <a:latin typeface="Cambria Math"/>
+                                    <a:latin typeface="Cambria Math" panose="02040503050406030204" pitchFamily="18" charset="0"/>
                                     <a:ea typeface="Cambria Math" panose="02040503050406030204" pitchFamily="18" charset="0"/>
                                   </a:rPr>
                                 </m:ctrlPr>
@@ -14784,7 +14950,7 @@
                                   <m:dPr>
                                     <m:ctrlPr>
                                       <a:rPr lang="en-US" sz="2800" i="1" smtClean="0">
-                                        <a:latin typeface="Cambria Math"/>
+                                        <a:latin typeface="Cambria Math" panose="02040503050406030204" pitchFamily="18" charset="0"/>
                                         <a:ea typeface="Cambria Math" panose="02040503050406030204" pitchFamily="18" charset="0"/>
                                       </a:rPr>
                                     </m:ctrlPr>
@@ -14794,7 +14960,7 @@
                                       <m:sSubPr>
                                         <m:ctrlPr>
                                           <a:rPr lang="en-US" sz="2800" i="1" smtClean="0">
-                                            <a:latin typeface="Cambria Math"/>
+                                            <a:latin typeface="Cambria Math" panose="02040503050406030204" pitchFamily="18" charset="0"/>
                                             <a:ea typeface="Cambria Math" panose="02040503050406030204" pitchFamily="18" charset="0"/>
                                           </a:rPr>
                                         </m:ctrlPr>
@@ -14829,7 +14995,7 @@
                                       <m:sSubPr>
                                         <m:ctrlPr>
                                           <a:rPr lang="en-US" sz="2800" i="1" smtClean="0">
-                                            <a:latin typeface="Cambria Math"/>
+                                            <a:latin typeface="Cambria Math" panose="02040503050406030204" pitchFamily="18" charset="0"/>
                                             <a:ea typeface="Cambria Math" panose="02040503050406030204" pitchFamily="18" charset="0"/>
                                           </a:rPr>
                                         </m:ctrlPr>
@@ -14884,7 +15050,7 @@
                       <m:fPr>
                         <m:ctrlPr>
                           <a:rPr lang="en-US" sz="2800" i="1" smtClean="0">
-                            <a:latin typeface="Cambria Math"/>
+                            <a:latin typeface="Cambria Math" panose="02040503050406030204" pitchFamily="18" charset="0"/>
                           </a:rPr>
                         </m:ctrlPr>
                       </m:fPr>
@@ -14900,7 +15066,7 @@
                           <m:sSubPr>
                             <m:ctrlPr>
                               <a:rPr lang="en-US" sz="2800" i="1" smtClean="0">
-                                <a:latin typeface="Cambria Math"/>
+                                <a:latin typeface="Cambria Math" panose="02040503050406030204" pitchFamily="18" charset="0"/>
                                 <a:ea typeface="Cambria Math" panose="02040503050406030204" pitchFamily="18" charset="0"/>
                               </a:rPr>
                             </m:ctrlPr>
@@ -14936,7 +15102,7 @@
                             <m:chr m:val="⃗"/>
                             <m:ctrlPr>
                               <a:rPr lang="en-US" sz="2800" i="1">
-                                <a:latin typeface="Cambria Math"/>
+                                <a:latin typeface="Cambria Math" panose="02040503050406030204" pitchFamily="18" charset="0"/>
                               </a:rPr>
                             </m:ctrlPr>
                           </m:accPr>
@@ -14970,7 +15136,7 @@
                           <m:sSubPr>
                             <m:ctrlPr>
                               <a:rPr lang="en-US" sz="2800" i="1" smtClean="0">
-                                <a:latin typeface="Cambria Math"/>
+                                <a:latin typeface="Cambria Math" panose="02040503050406030204" pitchFamily="18" charset="0"/>
                                 <a:ea typeface="Cambria Math" panose="02040503050406030204" pitchFamily="18" charset="0"/>
                               </a:rPr>
                             </m:ctrlPr>
@@ -15008,7 +15174,7 @@
                         <m:supHide m:val="on"/>
                         <m:ctrlPr>
                           <a:rPr lang="en-US" sz="2800" i="1" smtClean="0">
-                            <a:latin typeface="Cambria Math"/>
+                            <a:latin typeface="Cambria Math" panose="02040503050406030204" pitchFamily="18" charset="0"/>
                           </a:rPr>
                         </m:ctrlPr>
                       </m:naryPr>
@@ -15018,7 +15184,7 @@
                             <m:chr m:val="⃗"/>
                             <m:ctrlPr>
                               <a:rPr lang="en-US" sz="2800" i="1">
-                                <a:latin typeface="Cambria Math"/>
+                                <a:latin typeface="Cambria Math" panose="02040503050406030204" pitchFamily="18" charset="0"/>
                               </a:rPr>
                             </m:ctrlPr>
                           </m:accPr>
@@ -15042,7 +15208,7 @@
                           <m:sSubPr>
                             <m:ctrlPr>
                               <a:rPr lang="en-US" sz="2800" i="1">
-                                <a:latin typeface="Cambria Math"/>
+                                <a:latin typeface="Cambria Math" panose="02040503050406030204" pitchFamily="18" charset="0"/>
                                 <a:ea typeface="Cambria Math" panose="02040503050406030204" pitchFamily="18" charset="0"/>
                               </a:rPr>
                             </m:ctrlPr>
@@ -15080,7 +15246,7 @@
                           <m:sSubPr>
                             <m:ctrlPr>
                               <a:rPr lang="en-US" sz="2800" b="0" i="1" smtClean="0">
-                                <a:latin typeface="Cambria Math"/>
+                                <a:latin typeface="Cambria Math" panose="02040503050406030204" pitchFamily="18" charset="0"/>
                                 <a:ea typeface="Cambria Math" panose="02040503050406030204" pitchFamily="18" charset="0"/>
                               </a:rPr>
                             </m:ctrlPr>
@@ -15115,7 +15281,7 @@
                           <m:sSubPr>
                             <m:ctrlPr>
                               <a:rPr lang="en-US" sz="2800" b="0" i="1" smtClean="0">
-                                <a:latin typeface="Cambria Math"/>
+                                <a:latin typeface="Cambria Math" panose="02040503050406030204" pitchFamily="18" charset="0"/>
                                 <a:ea typeface="Cambria Math" panose="02040503050406030204" pitchFamily="18" charset="0"/>
                               </a:rPr>
                             </m:ctrlPr>
@@ -15162,7 +15328,7 @@
                       <m:sSubPr>
                         <m:ctrlPr>
                           <a:rPr lang="en-US" sz="2800" i="1" smtClean="0">
-                            <a:latin typeface="Cambria Math"/>
+                            <a:latin typeface="Cambria Math" panose="02040503050406030204" pitchFamily="18" charset="0"/>
                           </a:rPr>
                         </m:ctrlPr>
                       </m:sSubPr>
@@ -15194,7 +15360,7 @@
                       <m:fPr>
                         <m:ctrlPr>
                           <a:rPr lang="en-US" sz="2800" b="0" i="1" smtClean="0">
-                            <a:latin typeface="Cambria Math"/>
+                            <a:latin typeface="Cambria Math" panose="02040503050406030204" pitchFamily="18" charset="0"/>
                           </a:rPr>
                         </m:ctrlPr>
                       </m:fPr>
@@ -15213,7 +15379,7 @@
                             <m:endChr m:val="|"/>
                             <m:ctrlPr>
                               <a:rPr lang="en-US" sz="2800" b="0" i="1" smtClean="0">
-                                <a:latin typeface="Cambria Math"/>
+                                <a:latin typeface="Cambria Math" panose="02040503050406030204" pitchFamily="18" charset="0"/>
                               </a:rPr>
                             </m:ctrlPr>
                           </m:dPr>
@@ -15222,7 +15388,7 @@
                               <m:sSubPr>
                                 <m:ctrlPr>
                                   <a:rPr lang="en-US" sz="2800" b="0" i="1" smtClean="0">
-                                    <a:latin typeface="Cambria Math"/>
+                                    <a:latin typeface="Cambria Math" panose="02040503050406030204" pitchFamily="18" charset="0"/>
                                   </a:rPr>
                                 </m:ctrlPr>
                               </m:sSubPr>
@@ -15254,7 +15420,7 @@
                         <m:supHide m:val="on"/>
                         <m:ctrlPr>
                           <a:rPr lang="en-US" sz="2800" i="1">
-                            <a:latin typeface="Cambria Math"/>
+                            <a:latin typeface="Cambria Math" panose="02040503050406030204" pitchFamily="18" charset="0"/>
                           </a:rPr>
                         </m:ctrlPr>
                       </m:naryPr>
@@ -15264,7 +15430,7 @@
                             <m:chr m:val="⃗"/>
                             <m:ctrlPr>
                               <a:rPr lang="en-US" sz="2800" i="1">
-                                <a:latin typeface="Cambria Math"/>
+                                <a:latin typeface="Cambria Math" panose="02040503050406030204" pitchFamily="18" charset="0"/>
                               </a:rPr>
                             </m:ctrlPr>
                           </m:accPr>
@@ -15288,7 +15454,7 @@
                           <m:sSubPr>
                             <m:ctrlPr>
                               <a:rPr lang="en-US" sz="2800" i="1">
-                                <a:latin typeface="Cambria Math"/>
+                                <a:latin typeface="Cambria Math" panose="02040503050406030204" pitchFamily="18" charset="0"/>
                                 <a:ea typeface="Cambria Math" panose="02040503050406030204" pitchFamily="18" charset="0"/>
                               </a:rPr>
                             </m:ctrlPr>
@@ -15319,7 +15485,7 @@
                           <m:sSubPr>
                             <m:ctrlPr>
                               <a:rPr lang="en-US" sz="2800" i="1" smtClean="0">
-                                <a:latin typeface="Cambria Math"/>
+                                <a:latin typeface="Cambria Math" panose="02040503050406030204" pitchFamily="18" charset="0"/>
                                 <a:ea typeface="Cambria Math" panose="02040503050406030204" pitchFamily="18" charset="0"/>
                               </a:rPr>
                             </m:ctrlPr>
@@ -15359,7 +15525,7 @@
             </p:txBody>
           </p:sp>
         </mc:Choice>
-        <mc:Fallback>
+        <mc:Fallback xmlns="">
           <p:sp>
             <p:nvSpPr>
               <p:cNvPr id="6147" name="Rectangle 3"/>
@@ -15426,8 +15592,8 @@
           </a:p>
         </p:txBody>
       </p:sp>
-      <mc:AlternateContent xmlns:mc="http://schemas.openxmlformats.org/markup-compatibility/2006">
-        <mc:Choice xmlns:a14="http://schemas.microsoft.com/office/drawing/2010/main" Requires="a14">
+      <mc:AlternateContent xmlns:mc="http://schemas.openxmlformats.org/markup-compatibility/2006" xmlns:a14="http://schemas.microsoft.com/office/drawing/2010/main">
+        <mc:Choice Requires="a14">
           <p:sp>
             <p:nvSpPr>
               <p:cNvPr id="3" name="TextBox 2"/>
@@ -15465,7 +15631,7 @@
                         <m:chr m:val="⃗"/>
                         <m:ctrlPr>
                           <a:rPr lang="vi-VN" sz="2000" b="0" i="1" smtClean="0">
-                            <a:latin typeface="Cambria Math"/>
+                            <a:latin typeface="Cambria Math" panose="02040503050406030204" pitchFamily="18" charset="0"/>
                           </a:rPr>
                         </m:ctrlPr>
                       </m:accPr>
@@ -15490,7 +15656,7 @@
             </p:txBody>
           </p:sp>
         </mc:Choice>
-        <mc:Fallback>
+        <mc:Fallback xmlns="">
           <p:sp>
             <p:nvSpPr>
               <p:cNvPr id="3" name="TextBox 2"/>
@@ -16269,11 +16435,7 @@
             </a:r>
             <a:r>
               <a:rPr lang="vi-VN" sz="2800" smtClean="0"/>
-              <a:t>giá </a:t>
-            </a:r>
-            <a:r>
-              <a:rPr lang="vi-VN" sz="2800" smtClean="0"/>
-              <a:t>kết quả </a:t>
+              <a:t>giá kết quả </a:t>
             </a:r>
             <a:r>
               <a:rPr lang="vi-VN" sz="2800" dirty="0" smtClean="0"/>
@@ -16922,7 +17084,7 @@
   </a:extraClrSchemeLst>
   <a:extLst>
     <a:ext uri="{05A4C25C-085E-4340-85A3-A5531E510DB2}">
-      <thm15:themeFamily xmlns="" xmlns:thm15="http://schemas.microsoft.com/office/thememl/2012/main" name="Office Theme" id="{62F939B6-93AF-4DB8-9C6B-D6C7DFDC589F}" vid="{4A3C46E8-61CC-4603-A589-7422A47A8E4A}"/>
+      <thm15:themeFamily xmlns:thm15="http://schemas.microsoft.com/office/thememl/2012/main" name="Office Theme" id="{62F939B6-93AF-4DB8-9C6B-D6C7DFDC589F}" vid="{4A3C46E8-61CC-4603-A589-7422A47A8E4A}"/>
     </a:ext>
   </a:extLst>
 </a:theme>
@@ -17183,7 +17345,7 @@
   <a:extraClrSchemeLst/>
   <a:extLst>
     <a:ext uri="{05A4C25C-085E-4340-85A3-A5531E510DB2}">
-      <thm15:themeFamily xmlns="" xmlns:thm15="http://schemas.microsoft.com/office/thememl/2012/main" name="Office Theme" id="{62F939B6-93AF-4DB8-9C6B-D6C7DFDC589F}" vid="{4A3C46E8-61CC-4603-A589-7422A47A8E4A}"/>
+      <thm15:themeFamily xmlns:thm15="http://schemas.microsoft.com/office/thememl/2012/main" name="Office Theme" id="{62F939B6-93AF-4DB8-9C6B-D6C7DFDC589F}" vid="{4A3C46E8-61CC-4603-A589-7422A47A8E4A}"/>
     </a:ext>
   </a:extLst>
 </a:theme>

</xml_diff>